<commit_message>
three coil experiment figures update
</commit_message>
<xml_diff>
--- a/WPT/3-coil/Three-Coil-Journal/Experiment/2020.12.03/No_fault/New Microsoft PowerPoint Presentation.pptx
+++ b/WPT/3-coil/Three-Coil-Journal/Experiment/2020.12.03/No_fault/New Microsoft PowerPoint Presentation.pptx
@@ -11,6 +11,10 @@
     <p:sldId id="259" r:id="rId5"/>
     <p:sldId id="260" r:id="rId6"/>
     <p:sldId id="261" r:id="rId7"/>
+    <p:sldId id="263" r:id="rId8"/>
+    <p:sldId id="262" r:id="rId9"/>
+    <p:sldId id="264" r:id="rId10"/>
+    <p:sldId id="265" r:id="rId11"/>
   </p:sldIdLst>
   <p:sldSz cx="12192000" cy="6858000"/>
   <p:notesSz cx="6858000" cy="9144000"/>
@@ -264,7 +268,7 @@
           <a:p>
             <a:fld id="{D3379A49-B59E-4604-9C9C-0EFD942AC874}" type="datetimeFigureOut">
               <a:rPr lang="en-US" smtClean="0"/>
-              <a:t>2/16/2022</a:t>
+              <a:t>3/30/2022</a:t>
             </a:fld>
             <a:endParaRPr lang="en-US"/>
           </a:p>
@@ -462,7 +466,7 @@
           <a:p>
             <a:fld id="{D3379A49-B59E-4604-9C9C-0EFD942AC874}" type="datetimeFigureOut">
               <a:rPr lang="en-US" smtClean="0"/>
-              <a:t>2/16/2022</a:t>
+              <a:t>3/30/2022</a:t>
             </a:fld>
             <a:endParaRPr lang="en-US"/>
           </a:p>
@@ -670,7 +674,7 @@
           <a:p>
             <a:fld id="{D3379A49-B59E-4604-9C9C-0EFD942AC874}" type="datetimeFigureOut">
               <a:rPr lang="en-US" smtClean="0"/>
-              <a:t>2/16/2022</a:t>
+              <a:t>3/30/2022</a:t>
             </a:fld>
             <a:endParaRPr lang="en-US"/>
           </a:p>
@@ -868,7 +872,7 @@
           <a:p>
             <a:fld id="{D3379A49-B59E-4604-9C9C-0EFD942AC874}" type="datetimeFigureOut">
               <a:rPr lang="en-US" smtClean="0"/>
-              <a:t>2/16/2022</a:t>
+              <a:t>3/30/2022</a:t>
             </a:fld>
             <a:endParaRPr lang="en-US"/>
           </a:p>
@@ -1143,7 +1147,7 @@
           <a:p>
             <a:fld id="{D3379A49-B59E-4604-9C9C-0EFD942AC874}" type="datetimeFigureOut">
               <a:rPr lang="en-US" smtClean="0"/>
-              <a:t>2/16/2022</a:t>
+              <a:t>3/30/2022</a:t>
             </a:fld>
             <a:endParaRPr lang="en-US"/>
           </a:p>
@@ -1408,7 +1412,7 @@
           <a:p>
             <a:fld id="{D3379A49-B59E-4604-9C9C-0EFD942AC874}" type="datetimeFigureOut">
               <a:rPr lang="en-US" smtClean="0"/>
-              <a:t>2/16/2022</a:t>
+              <a:t>3/30/2022</a:t>
             </a:fld>
             <a:endParaRPr lang="en-US"/>
           </a:p>
@@ -1820,7 +1824,7 @@
           <a:p>
             <a:fld id="{D3379A49-B59E-4604-9C9C-0EFD942AC874}" type="datetimeFigureOut">
               <a:rPr lang="en-US" smtClean="0"/>
-              <a:t>2/16/2022</a:t>
+              <a:t>3/30/2022</a:t>
             </a:fld>
             <a:endParaRPr lang="en-US"/>
           </a:p>
@@ -1961,7 +1965,7 @@
           <a:p>
             <a:fld id="{D3379A49-B59E-4604-9C9C-0EFD942AC874}" type="datetimeFigureOut">
               <a:rPr lang="en-US" smtClean="0"/>
-              <a:t>2/16/2022</a:t>
+              <a:t>3/30/2022</a:t>
             </a:fld>
             <a:endParaRPr lang="en-US"/>
           </a:p>
@@ -2074,7 +2078,7 @@
           <a:p>
             <a:fld id="{D3379A49-B59E-4604-9C9C-0EFD942AC874}" type="datetimeFigureOut">
               <a:rPr lang="en-US" smtClean="0"/>
-              <a:t>2/16/2022</a:t>
+              <a:t>3/30/2022</a:t>
             </a:fld>
             <a:endParaRPr lang="en-US"/>
           </a:p>
@@ -2385,7 +2389,7 @@
           <a:p>
             <a:fld id="{D3379A49-B59E-4604-9C9C-0EFD942AC874}" type="datetimeFigureOut">
               <a:rPr lang="en-US" smtClean="0"/>
-              <a:t>2/16/2022</a:t>
+              <a:t>3/30/2022</a:t>
             </a:fld>
             <a:endParaRPr lang="en-US"/>
           </a:p>
@@ -2673,7 +2677,7 @@
           <a:p>
             <a:fld id="{D3379A49-B59E-4604-9C9C-0EFD942AC874}" type="datetimeFigureOut">
               <a:rPr lang="en-US" smtClean="0"/>
-              <a:t>2/16/2022</a:t>
+              <a:t>3/30/2022</a:t>
             </a:fld>
             <a:endParaRPr lang="en-US"/>
           </a:p>
@@ -2914,7 +2918,7 @@
           <a:p>
             <a:fld id="{D3379A49-B59E-4604-9C9C-0EFD942AC874}" type="datetimeFigureOut">
               <a:rPr lang="en-US" smtClean="0"/>
-              <a:t>2/16/2022</a:t>
+              <a:t>3/30/2022</a:t>
             </a:fld>
             <a:endParaRPr lang="en-US"/>
           </a:p>
@@ -3461,6 +3465,985 @@
 </p:sld>
 </file>
 
+<file path=ppt/slides/slide10.xml><?xml version="1.0" encoding="utf-8"?>
+<p:sld xmlns:a="http://schemas.openxmlformats.org/drawingml/2006/main" xmlns:r="http://schemas.openxmlformats.org/officeDocument/2006/relationships" xmlns:p="http://schemas.openxmlformats.org/presentationml/2006/main">
+  <p:cSld>
+    <p:spTree>
+      <p:nvGrpSpPr>
+        <p:cNvPr id="1" name=""/>
+        <p:cNvGrpSpPr/>
+        <p:nvPr/>
+      </p:nvGrpSpPr>
+      <p:grpSpPr>
+        <a:xfrm>
+          <a:off x="0" y="0"/>
+          <a:ext cx="0" cy="0"/>
+          <a:chOff x="0" y="0"/>
+          <a:chExt cx="0" cy="0"/>
+        </a:xfrm>
+      </p:grpSpPr>
+      <p:sp>
+        <p:nvSpPr>
+          <p:cNvPr id="7" name="Rectangle 6">
+            <a:extLst>
+              <a:ext uri="{FF2B5EF4-FFF2-40B4-BE49-F238E27FC236}">
+                <a16:creationId xmlns:a16="http://schemas.microsoft.com/office/drawing/2014/main" id="{0F51078E-1659-4541-95A9-6C8DA77C1AAB}"/>
+              </a:ext>
+            </a:extLst>
+          </p:cNvPr>
+          <p:cNvSpPr/>
+          <p:nvPr/>
+        </p:nvSpPr>
+        <p:spPr>
+          <a:xfrm>
+            <a:off x="1" y="538717"/>
+            <a:ext cx="13334814" cy="3676060"/>
+          </a:xfrm>
+          <a:prstGeom prst="rect">
+            <a:avLst/>
+          </a:prstGeom>
+          <a:solidFill>
+            <a:schemeClr val="bg1"/>
+          </a:solidFill>
+          <a:ln>
+            <a:noFill/>
+          </a:ln>
+        </p:spPr>
+        <p:style>
+          <a:lnRef idx="2">
+            <a:schemeClr val="accent1">
+              <a:shade val="50000"/>
+            </a:schemeClr>
+          </a:lnRef>
+          <a:fillRef idx="1">
+            <a:schemeClr val="accent1"/>
+          </a:fillRef>
+          <a:effectRef idx="0">
+            <a:schemeClr val="accent1"/>
+          </a:effectRef>
+          <a:fontRef idx="minor">
+            <a:schemeClr val="lt1"/>
+          </a:fontRef>
+        </p:style>
+        <p:txBody>
+          <a:bodyPr rtlCol="0" anchor="ctr"/>
+          <a:lstStyle/>
+          <a:p>
+            <a:pPr algn="ctr"/>
+            <a:endParaRPr lang="en-US"/>
+          </a:p>
+        </p:txBody>
+      </p:sp>
+      <p:pic>
+        <p:nvPicPr>
+          <p:cNvPr id="5" name="Picture 4">
+            <a:extLst>
+              <a:ext uri="{FF2B5EF4-FFF2-40B4-BE49-F238E27FC236}">
+                <a16:creationId xmlns:a16="http://schemas.microsoft.com/office/drawing/2014/main" id="{3AE4CF46-3DFA-4F13-99B2-CEC3382493E4}"/>
+              </a:ext>
+            </a:extLst>
+          </p:cNvPr>
+          <p:cNvPicPr>
+            <a:picLocks noChangeAspect="1"/>
+          </p:cNvPicPr>
+          <p:nvPr/>
+        </p:nvPicPr>
+        <p:blipFill rotWithShape="1">
+          <a:blip r:embed="rId2"/>
+          <a:srcRect l="68485" t="35437" r="19864" b="-1398"/>
+          <a:stretch/>
+        </p:blipFill>
+        <p:spPr>
+          <a:xfrm>
+            <a:off x="106532" y="790113"/>
+            <a:ext cx="443884" cy="1256560"/>
+          </a:xfrm>
+          <a:prstGeom prst="rect">
+            <a:avLst/>
+          </a:prstGeom>
+        </p:spPr>
+      </p:pic>
+      <p:pic>
+        <p:nvPicPr>
+          <p:cNvPr id="6" name="Picture 5">
+            <a:extLst>
+              <a:ext uri="{FF2B5EF4-FFF2-40B4-BE49-F238E27FC236}">
+                <a16:creationId xmlns:a16="http://schemas.microsoft.com/office/drawing/2014/main" id="{FD5469C1-8E0E-45F9-9B9B-352747BADC22}"/>
+              </a:ext>
+            </a:extLst>
+          </p:cNvPr>
+          <p:cNvPicPr>
+            <a:picLocks noChangeAspect="1"/>
+          </p:cNvPicPr>
+          <p:nvPr/>
+        </p:nvPicPr>
+        <p:blipFill rotWithShape="1">
+          <a:blip r:embed="rId3"/>
+          <a:srcRect t="76238" b="10716"/>
+          <a:stretch/>
+        </p:blipFill>
+        <p:spPr>
+          <a:xfrm>
+            <a:off x="578301" y="3435706"/>
+            <a:ext cx="3810000" cy="248528"/>
+          </a:xfrm>
+          <a:prstGeom prst="rect">
+            <a:avLst/>
+          </a:prstGeom>
+        </p:spPr>
+      </p:pic>
+      <p:pic>
+        <p:nvPicPr>
+          <p:cNvPr id="9" name="Picture 8">
+            <a:extLst>
+              <a:ext uri="{FF2B5EF4-FFF2-40B4-BE49-F238E27FC236}">
+                <a16:creationId xmlns:a16="http://schemas.microsoft.com/office/drawing/2014/main" id="{BF6435F2-C277-4233-99FA-64204E3FFFC2}"/>
+              </a:ext>
+            </a:extLst>
+          </p:cNvPr>
+          <p:cNvPicPr>
+            <a:picLocks noChangeAspect="1"/>
+          </p:cNvPicPr>
+          <p:nvPr/>
+        </p:nvPicPr>
+        <p:blipFill rotWithShape="1">
+          <a:blip r:embed="rId2"/>
+          <a:srcRect l="68485" t="35437" r="19864" b="-1398"/>
+          <a:stretch/>
+        </p:blipFill>
+        <p:spPr>
+          <a:xfrm>
+            <a:off x="4542914" y="790113"/>
+            <a:ext cx="443884" cy="1256560"/>
+          </a:xfrm>
+          <a:prstGeom prst="rect">
+            <a:avLst/>
+          </a:prstGeom>
+        </p:spPr>
+      </p:pic>
+      <p:pic>
+        <p:nvPicPr>
+          <p:cNvPr id="11" name="Picture 10">
+            <a:extLst>
+              <a:ext uri="{FF2B5EF4-FFF2-40B4-BE49-F238E27FC236}">
+                <a16:creationId xmlns:a16="http://schemas.microsoft.com/office/drawing/2014/main" id="{524759C8-9C8A-4752-937A-2DBA0DBF1B71}"/>
+              </a:ext>
+            </a:extLst>
+          </p:cNvPr>
+          <p:cNvPicPr>
+            <a:picLocks noChangeAspect="1"/>
+          </p:cNvPicPr>
+          <p:nvPr/>
+        </p:nvPicPr>
+        <p:blipFill rotWithShape="1">
+          <a:blip r:embed="rId3"/>
+          <a:srcRect t="76238" b="10716"/>
+          <a:stretch/>
+        </p:blipFill>
+        <p:spPr>
+          <a:xfrm>
+            <a:off x="5044414" y="3429001"/>
+            <a:ext cx="3810000" cy="248528"/>
+          </a:xfrm>
+          <a:prstGeom prst="rect">
+            <a:avLst/>
+          </a:prstGeom>
+        </p:spPr>
+      </p:pic>
+      <p:pic>
+        <p:nvPicPr>
+          <p:cNvPr id="13" name="Picture 12">
+            <a:extLst>
+              <a:ext uri="{FF2B5EF4-FFF2-40B4-BE49-F238E27FC236}">
+                <a16:creationId xmlns:a16="http://schemas.microsoft.com/office/drawing/2014/main" id="{4E43710F-D92F-4FD5-B4AB-8407541969D4}"/>
+              </a:ext>
+            </a:extLst>
+          </p:cNvPr>
+          <p:cNvPicPr>
+            <a:picLocks noChangeAspect="1"/>
+          </p:cNvPicPr>
+          <p:nvPr/>
+        </p:nvPicPr>
+        <p:blipFill rotWithShape="1">
+          <a:blip r:embed="rId4"/>
+          <a:srcRect l="69281" t="46680" r="19068" b="10310"/>
+          <a:stretch/>
+        </p:blipFill>
+        <p:spPr>
+          <a:xfrm>
+            <a:off x="9038069" y="1008726"/>
+            <a:ext cx="443884" cy="819334"/>
+          </a:xfrm>
+          <a:prstGeom prst="rect">
+            <a:avLst/>
+          </a:prstGeom>
+        </p:spPr>
+      </p:pic>
+      <p:pic>
+        <p:nvPicPr>
+          <p:cNvPr id="15" name="Picture 14">
+            <a:extLst>
+              <a:ext uri="{FF2B5EF4-FFF2-40B4-BE49-F238E27FC236}">
+                <a16:creationId xmlns:a16="http://schemas.microsoft.com/office/drawing/2014/main" id="{3AF15EA2-5805-4770-BC36-A14E47320190}"/>
+              </a:ext>
+            </a:extLst>
+          </p:cNvPr>
+          <p:cNvPicPr>
+            <a:picLocks noChangeAspect="1"/>
+          </p:cNvPicPr>
+          <p:nvPr/>
+        </p:nvPicPr>
+        <p:blipFill rotWithShape="1">
+          <a:blip r:embed="rId5"/>
+          <a:srcRect l="69015" t="33728" r="17670" b="4446"/>
+          <a:stretch/>
+        </p:blipFill>
+        <p:spPr>
+          <a:xfrm>
+            <a:off x="9048714" y="2243347"/>
+            <a:ext cx="443884" cy="1177770"/>
+          </a:xfrm>
+          <a:prstGeom prst="rect">
+            <a:avLst/>
+          </a:prstGeom>
+        </p:spPr>
+      </p:pic>
+      <p:pic>
+        <p:nvPicPr>
+          <p:cNvPr id="16" name="Picture 15">
+            <a:extLst>
+              <a:ext uri="{FF2B5EF4-FFF2-40B4-BE49-F238E27FC236}">
+                <a16:creationId xmlns:a16="http://schemas.microsoft.com/office/drawing/2014/main" id="{7DF361E2-AE37-4184-8F86-CF645E531ABF}"/>
+              </a:ext>
+            </a:extLst>
+          </p:cNvPr>
+          <p:cNvPicPr>
+            <a:picLocks noChangeAspect="1"/>
+          </p:cNvPicPr>
+          <p:nvPr/>
+        </p:nvPicPr>
+        <p:blipFill rotWithShape="1">
+          <a:blip r:embed="rId5"/>
+          <a:srcRect l="69015" t="33728" r="17670" b="33136"/>
+          <a:stretch/>
+        </p:blipFill>
+        <p:spPr>
+          <a:xfrm>
+            <a:off x="4542914" y="2467715"/>
+            <a:ext cx="443884" cy="631239"/>
+          </a:xfrm>
+          <a:prstGeom prst="rect">
+            <a:avLst/>
+          </a:prstGeom>
+        </p:spPr>
+      </p:pic>
+      <p:pic>
+        <p:nvPicPr>
+          <p:cNvPr id="17" name="Picture 16">
+            <a:extLst>
+              <a:ext uri="{FF2B5EF4-FFF2-40B4-BE49-F238E27FC236}">
+                <a16:creationId xmlns:a16="http://schemas.microsoft.com/office/drawing/2014/main" id="{C07F6909-406F-4DD9-9218-7C6271E539E6}"/>
+              </a:ext>
+            </a:extLst>
+          </p:cNvPr>
+          <p:cNvPicPr>
+            <a:picLocks noChangeAspect="1"/>
+          </p:cNvPicPr>
+          <p:nvPr/>
+        </p:nvPicPr>
+        <p:blipFill rotWithShape="1">
+          <a:blip r:embed="rId5"/>
+          <a:srcRect l="69015" t="33728" r="17670" b="19087"/>
+          <a:stretch/>
+        </p:blipFill>
+        <p:spPr>
+          <a:xfrm>
+            <a:off x="81989" y="2333902"/>
+            <a:ext cx="443884" cy="898864"/>
+          </a:xfrm>
+          <a:prstGeom prst="rect">
+            <a:avLst/>
+          </a:prstGeom>
+        </p:spPr>
+      </p:pic>
+      <p:pic>
+        <p:nvPicPr>
+          <p:cNvPr id="21" name="Picture 20">
+            <a:extLst>
+              <a:ext uri="{FF2B5EF4-FFF2-40B4-BE49-F238E27FC236}">
+                <a16:creationId xmlns:a16="http://schemas.microsoft.com/office/drawing/2014/main" id="{72518B04-969D-4DE3-8DAA-BC42E0A2890E}"/>
+              </a:ext>
+            </a:extLst>
+          </p:cNvPr>
+          <p:cNvPicPr>
+            <a:picLocks noChangeAspect="1"/>
+          </p:cNvPicPr>
+          <p:nvPr/>
+        </p:nvPicPr>
+        <p:blipFill rotWithShape="1">
+          <a:blip r:embed="rId3"/>
+          <a:srcRect t="76238" b="11068"/>
+          <a:stretch/>
+        </p:blipFill>
+        <p:spPr>
+          <a:xfrm>
+            <a:off x="9524814" y="3435706"/>
+            <a:ext cx="3810000" cy="241824"/>
+          </a:xfrm>
+          <a:prstGeom prst="rect">
+            <a:avLst/>
+          </a:prstGeom>
+        </p:spPr>
+      </p:pic>
+      <p:pic>
+        <p:nvPicPr>
+          <p:cNvPr id="2" name="Picture 1">
+            <a:extLst>
+              <a:ext uri="{FF2B5EF4-FFF2-40B4-BE49-F238E27FC236}">
+                <a16:creationId xmlns:a16="http://schemas.microsoft.com/office/drawing/2014/main" id="{30D689F7-656A-407C-B55F-ED4E1ADD1EE4}"/>
+              </a:ext>
+            </a:extLst>
+          </p:cNvPr>
+          <p:cNvPicPr>
+            <a:picLocks noChangeAspect="1"/>
+          </p:cNvPicPr>
+          <p:nvPr/>
+        </p:nvPicPr>
+        <p:blipFill rotWithShape="1">
+          <a:blip r:embed="rId6"/>
+          <a:srcRect l="6749" r="6480" b="14869"/>
+          <a:stretch/>
+        </p:blipFill>
+        <p:spPr>
+          <a:xfrm>
+            <a:off x="846788" y="600353"/>
+            <a:ext cx="3140618" cy="1443360"/>
+          </a:xfrm>
+          <a:prstGeom prst="rect">
+            <a:avLst/>
+          </a:prstGeom>
+        </p:spPr>
+      </p:pic>
+      <p:pic>
+        <p:nvPicPr>
+          <p:cNvPr id="3" name="Picture 2">
+            <a:extLst>
+              <a:ext uri="{FF2B5EF4-FFF2-40B4-BE49-F238E27FC236}">
+                <a16:creationId xmlns:a16="http://schemas.microsoft.com/office/drawing/2014/main" id="{7A6B6DBA-1DBA-4D7E-AA77-F55379F561DD}"/>
+              </a:ext>
+            </a:extLst>
+          </p:cNvPr>
+          <p:cNvPicPr>
+            <a:picLocks noChangeAspect="1"/>
+          </p:cNvPicPr>
+          <p:nvPr/>
+        </p:nvPicPr>
+        <p:blipFill rotWithShape="1">
+          <a:blip r:embed="rId7"/>
+          <a:srcRect l="7521" b="24795"/>
+          <a:stretch/>
+        </p:blipFill>
+        <p:spPr>
+          <a:xfrm>
+            <a:off x="846787" y="1983420"/>
+            <a:ext cx="3003739" cy="1489968"/>
+          </a:xfrm>
+          <a:prstGeom prst="rect">
+            <a:avLst/>
+          </a:prstGeom>
+        </p:spPr>
+      </p:pic>
+      <p:pic>
+        <p:nvPicPr>
+          <p:cNvPr id="10" name="Picture 9">
+            <a:extLst>
+              <a:ext uri="{FF2B5EF4-FFF2-40B4-BE49-F238E27FC236}">
+                <a16:creationId xmlns:a16="http://schemas.microsoft.com/office/drawing/2014/main" id="{1E8B80EB-9730-49F4-8C72-C6F79CC6EF07}"/>
+              </a:ext>
+            </a:extLst>
+          </p:cNvPr>
+          <p:cNvPicPr>
+            <a:picLocks noChangeAspect="1"/>
+          </p:cNvPicPr>
+          <p:nvPr/>
+        </p:nvPicPr>
+        <p:blipFill rotWithShape="1">
+          <a:blip r:embed="rId8"/>
+          <a:srcRect l="6749" r="5784" b="24795"/>
+          <a:stretch/>
+        </p:blipFill>
+        <p:spPr>
+          <a:xfrm>
+            <a:off x="5316715" y="553745"/>
+            <a:ext cx="3165845" cy="1489968"/>
+          </a:xfrm>
+          <a:prstGeom prst="rect">
+            <a:avLst/>
+          </a:prstGeom>
+        </p:spPr>
+      </p:pic>
+      <p:pic>
+        <p:nvPicPr>
+          <p:cNvPr id="19" name="Picture 18">
+            <a:extLst>
+              <a:ext uri="{FF2B5EF4-FFF2-40B4-BE49-F238E27FC236}">
+                <a16:creationId xmlns:a16="http://schemas.microsoft.com/office/drawing/2014/main" id="{734FAF7D-F0E5-40CB-BDD4-63FDD4F32B9F}"/>
+              </a:ext>
+            </a:extLst>
+          </p:cNvPr>
+          <p:cNvPicPr>
+            <a:picLocks noChangeAspect="1"/>
+          </p:cNvPicPr>
+          <p:nvPr/>
+        </p:nvPicPr>
+        <p:blipFill rotWithShape="1">
+          <a:blip r:embed="rId9"/>
+          <a:srcRect l="7512" b="24795"/>
+          <a:stretch/>
+        </p:blipFill>
+        <p:spPr>
+          <a:xfrm>
+            <a:off x="5316437" y="1983420"/>
+            <a:ext cx="3004017" cy="1489968"/>
+          </a:xfrm>
+          <a:prstGeom prst="rect">
+            <a:avLst/>
+          </a:prstGeom>
+        </p:spPr>
+      </p:pic>
+      <p:pic>
+        <p:nvPicPr>
+          <p:cNvPr id="27" name="Picture 26">
+            <a:extLst>
+              <a:ext uri="{FF2B5EF4-FFF2-40B4-BE49-F238E27FC236}">
+                <a16:creationId xmlns:a16="http://schemas.microsoft.com/office/drawing/2014/main" id="{0256612F-4B90-4BAE-9D1E-CCDD156C22D7}"/>
+              </a:ext>
+            </a:extLst>
+          </p:cNvPr>
+          <p:cNvPicPr>
+            <a:picLocks noChangeAspect="1"/>
+          </p:cNvPicPr>
+          <p:nvPr/>
+        </p:nvPicPr>
+        <p:blipFill rotWithShape="1">
+          <a:blip r:embed="rId10"/>
+          <a:srcRect l="6749" r="5784" b="24036"/>
+          <a:stretch/>
+        </p:blipFill>
+        <p:spPr>
+          <a:xfrm>
+            <a:off x="9864350" y="538717"/>
+            <a:ext cx="3165845" cy="1504996"/>
+          </a:xfrm>
+          <a:prstGeom prst="rect">
+            <a:avLst/>
+          </a:prstGeom>
+        </p:spPr>
+      </p:pic>
+      <p:pic>
+        <p:nvPicPr>
+          <p:cNvPr id="28" name="Picture 27">
+            <a:extLst>
+              <a:ext uri="{FF2B5EF4-FFF2-40B4-BE49-F238E27FC236}">
+                <a16:creationId xmlns:a16="http://schemas.microsoft.com/office/drawing/2014/main" id="{D66E4971-DD6F-447D-913A-3639AA0215A6}"/>
+              </a:ext>
+            </a:extLst>
+          </p:cNvPr>
+          <p:cNvPicPr>
+            <a:picLocks noChangeAspect="1"/>
+          </p:cNvPicPr>
+          <p:nvPr/>
+        </p:nvPicPr>
+        <p:blipFill rotWithShape="1">
+          <a:blip r:embed="rId11"/>
+          <a:srcRect l="7512" b="24039"/>
+          <a:stretch/>
+        </p:blipFill>
+        <p:spPr>
+          <a:xfrm>
+            <a:off x="9864072" y="1968438"/>
+            <a:ext cx="3004017" cy="1504950"/>
+          </a:xfrm>
+          <a:prstGeom prst="rect">
+            <a:avLst/>
+          </a:prstGeom>
+        </p:spPr>
+      </p:pic>
+      <p:sp>
+        <p:nvSpPr>
+          <p:cNvPr id="29" name="TextBox 28">
+            <a:extLst>
+              <a:ext uri="{FF2B5EF4-FFF2-40B4-BE49-F238E27FC236}">
+                <a16:creationId xmlns:a16="http://schemas.microsoft.com/office/drawing/2014/main" id="{BD2C6DC2-686C-4940-97BF-0887EF0EEA1E}"/>
+              </a:ext>
+            </a:extLst>
+          </p:cNvPr>
+          <p:cNvSpPr txBox="1"/>
+          <p:nvPr/>
+        </p:nvSpPr>
+        <p:spPr>
+          <a:xfrm>
+            <a:off x="2085990" y="3876223"/>
+            <a:ext cx="1085850" cy="338554"/>
+          </a:xfrm>
+          <a:prstGeom prst="rect">
+            <a:avLst/>
+          </a:prstGeom>
+          <a:noFill/>
+        </p:spPr>
+        <p:txBody>
+          <a:bodyPr wrap="square" rtlCol="0">
+            <a:spAutoFit/>
+          </a:bodyPr>
+          <a:lstStyle/>
+          <a:p>
+            <a:r>
+              <a:rPr lang="en-US" sz="1600" dirty="0">
+                <a:latin typeface="Times New Roman" panose="02020603050405020304" pitchFamily="18" charset="0"/>
+                <a:cs typeface="Times New Roman" panose="02020603050405020304" pitchFamily="18" charset="0"/>
+              </a:rPr>
+              <a:t>(a)</a:t>
+            </a:r>
+          </a:p>
+        </p:txBody>
+      </p:sp>
+      <p:sp>
+        <p:nvSpPr>
+          <p:cNvPr id="30" name="TextBox 29">
+            <a:extLst>
+              <a:ext uri="{FF2B5EF4-FFF2-40B4-BE49-F238E27FC236}">
+                <a16:creationId xmlns:a16="http://schemas.microsoft.com/office/drawing/2014/main" id="{04F0A6BA-F591-4822-BC5D-7CB2C1AEFD18}"/>
+              </a:ext>
+            </a:extLst>
+          </p:cNvPr>
+          <p:cNvSpPr txBox="1"/>
+          <p:nvPr/>
+        </p:nvSpPr>
+        <p:spPr>
+          <a:xfrm>
+            <a:off x="6551969" y="3876223"/>
+            <a:ext cx="1085850" cy="338554"/>
+          </a:xfrm>
+          <a:prstGeom prst="rect">
+            <a:avLst/>
+          </a:prstGeom>
+          <a:noFill/>
+        </p:spPr>
+        <p:txBody>
+          <a:bodyPr wrap="square" rtlCol="0">
+            <a:spAutoFit/>
+          </a:bodyPr>
+          <a:lstStyle/>
+          <a:p>
+            <a:r>
+              <a:rPr lang="en-US" sz="1600" dirty="0">
+                <a:latin typeface="Times New Roman" panose="02020603050405020304" pitchFamily="18" charset="0"/>
+                <a:cs typeface="Times New Roman" panose="02020603050405020304" pitchFamily="18" charset="0"/>
+              </a:rPr>
+              <a:t>(b)</a:t>
+            </a:r>
+          </a:p>
+        </p:txBody>
+      </p:sp>
+      <p:sp>
+        <p:nvSpPr>
+          <p:cNvPr id="31" name="TextBox 30">
+            <a:extLst>
+              <a:ext uri="{FF2B5EF4-FFF2-40B4-BE49-F238E27FC236}">
+                <a16:creationId xmlns:a16="http://schemas.microsoft.com/office/drawing/2014/main" id="{CB0DB553-8A88-48E7-A761-2A2E59EFE9F1}"/>
+              </a:ext>
+            </a:extLst>
+          </p:cNvPr>
+          <p:cNvSpPr txBox="1"/>
+          <p:nvPr/>
+        </p:nvSpPr>
+        <p:spPr>
+          <a:xfrm>
+            <a:off x="11017948" y="3876223"/>
+            <a:ext cx="1085850" cy="338554"/>
+          </a:xfrm>
+          <a:prstGeom prst="rect">
+            <a:avLst/>
+          </a:prstGeom>
+          <a:noFill/>
+        </p:spPr>
+        <p:txBody>
+          <a:bodyPr wrap="square" rtlCol="0">
+            <a:spAutoFit/>
+          </a:bodyPr>
+          <a:lstStyle/>
+          <a:p>
+            <a:r>
+              <a:rPr lang="en-US" sz="1600" dirty="0">
+                <a:latin typeface="Times New Roman" panose="02020603050405020304" pitchFamily="18" charset="0"/>
+                <a:cs typeface="Times New Roman" panose="02020603050405020304" pitchFamily="18" charset="0"/>
+              </a:rPr>
+              <a:t>(c)</a:t>
+            </a:r>
+          </a:p>
+        </p:txBody>
+      </p:sp>
+      <p:pic>
+        <p:nvPicPr>
+          <p:cNvPr id="4" name="Picture 3">
+            <a:extLst>
+              <a:ext uri="{FF2B5EF4-FFF2-40B4-BE49-F238E27FC236}">
+                <a16:creationId xmlns:a16="http://schemas.microsoft.com/office/drawing/2014/main" id="{3DE36A61-6984-4A25-8E34-0A8AE86F937F}"/>
+              </a:ext>
+            </a:extLst>
+          </p:cNvPr>
+          <p:cNvPicPr>
+            <a:picLocks noChangeAspect="1"/>
+          </p:cNvPicPr>
+          <p:nvPr/>
+        </p:nvPicPr>
+        <p:blipFill rotWithShape="1">
+          <a:blip r:embed="rId12"/>
+          <a:srcRect t="87456"/>
+          <a:stretch/>
+        </p:blipFill>
+        <p:spPr>
+          <a:xfrm>
+            <a:off x="5044414" y="3663605"/>
+            <a:ext cx="3248025" cy="248528"/>
+          </a:xfrm>
+          <a:prstGeom prst="rect">
+            <a:avLst/>
+          </a:prstGeom>
+        </p:spPr>
+      </p:pic>
+      <p:pic>
+        <p:nvPicPr>
+          <p:cNvPr id="22" name="Picture 21">
+            <a:extLst>
+              <a:ext uri="{FF2B5EF4-FFF2-40B4-BE49-F238E27FC236}">
+                <a16:creationId xmlns:a16="http://schemas.microsoft.com/office/drawing/2014/main" id="{95A6FF2D-B5BD-483F-A678-0A67755FE2A0}"/>
+              </a:ext>
+            </a:extLst>
+          </p:cNvPr>
+          <p:cNvPicPr>
+            <a:picLocks noChangeAspect="1"/>
+          </p:cNvPicPr>
+          <p:nvPr/>
+        </p:nvPicPr>
+        <p:blipFill rotWithShape="1">
+          <a:blip r:embed="rId12"/>
+          <a:srcRect r="91314" b="23450"/>
+          <a:stretch/>
+        </p:blipFill>
+        <p:spPr>
+          <a:xfrm>
+            <a:off x="663708" y="1956786"/>
+            <a:ext cx="282123" cy="1516602"/>
+          </a:xfrm>
+          <a:prstGeom prst="rect">
+            <a:avLst/>
+          </a:prstGeom>
+        </p:spPr>
+      </p:pic>
+      <p:pic>
+        <p:nvPicPr>
+          <p:cNvPr id="23" name="Picture 22">
+            <a:extLst>
+              <a:ext uri="{FF2B5EF4-FFF2-40B4-BE49-F238E27FC236}">
+                <a16:creationId xmlns:a16="http://schemas.microsoft.com/office/drawing/2014/main" id="{F9D45A0F-CDD0-4E59-9D1C-7C05CC882FCE}"/>
+              </a:ext>
+            </a:extLst>
+          </p:cNvPr>
+          <p:cNvPicPr>
+            <a:picLocks noChangeAspect="1"/>
+          </p:cNvPicPr>
+          <p:nvPr/>
+        </p:nvPicPr>
+        <p:blipFill rotWithShape="1">
+          <a:blip r:embed="rId12"/>
+          <a:srcRect t="87456"/>
+          <a:stretch/>
+        </p:blipFill>
+        <p:spPr>
+          <a:xfrm>
+            <a:off x="578301" y="3663605"/>
+            <a:ext cx="3248025" cy="248528"/>
+          </a:xfrm>
+          <a:prstGeom prst="rect">
+            <a:avLst/>
+          </a:prstGeom>
+        </p:spPr>
+      </p:pic>
+      <p:pic>
+        <p:nvPicPr>
+          <p:cNvPr id="24" name="Picture 23">
+            <a:extLst>
+              <a:ext uri="{FF2B5EF4-FFF2-40B4-BE49-F238E27FC236}">
+                <a16:creationId xmlns:a16="http://schemas.microsoft.com/office/drawing/2014/main" id="{84B13780-16A5-484D-8AA5-3ABF6B1EF70E}"/>
+              </a:ext>
+            </a:extLst>
+          </p:cNvPr>
+          <p:cNvPicPr>
+            <a:picLocks noChangeAspect="1"/>
+          </p:cNvPicPr>
+          <p:nvPr/>
+        </p:nvPicPr>
+        <p:blipFill rotWithShape="1">
+          <a:blip r:embed="rId12"/>
+          <a:srcRect t="86330"/>
+          <a:stretch/>
+        </p:blipFill>
+        <p:spPr>
+          <a:xfrm>
+            <a:off x="9524814" y="3627693"/>
+            <a:ext cx="3248025" cy="270832"/>
+          </a:xfrm>
+          <a:prstGeom prst="rect">
+            <a:avLst/>
+          </a:prstGeom>
+        </p:spPr>
+      </p:pic>
+      <p:pic>
+        <p:nvPicPr>
+          <p:cNvPr id="25" name="Picture 24">
+            <a:extLst>
+              <a:ext uri="{FF2B5EF4-FFF2-40B4-BE49-F238E27FC236}">
+                <a16:creationId xmlns:a16="http://schemas.microsoft.com/office/drawing/2014/main" id="{C4AD277E-81C2-4D74-BD7A-8A2DBBC5972B}"/>
+              </a:ext>
+            </a:extLst>
+          </p:cNvPr>
+          <p:cNvPicPr>
+            <a:picLocks noChangeAspect="1"/>
+          </p:cNvPicPr>
+          <p:nvPr/>
+        </p:nvPicPr>
+        <p:blipFill rotWithShape="1">
+          <a:blip r:embed="rId12"/>
+          <a:srcRect r="91314" b="23450"/>
+          <a:stretch/>
+        </p:blipFill>
+        <p:spPr>
+          <a:xfrm>
+            <a:off x="663708" y="587940"/>
+            <a:ext cx="282123" cy="1516602"/>
+          </a:xfrm>
+          <a:prstGeom prst="rect">
+            <a:avLst/>
+          </a:prstGeom>
+        </p:spPr>
+      </p:pic>
+      <p:pic>
+        <p:nvPicPr>
+          <p:cNvPr id="26" name="Picture 25">
+            <a:extLst>
+              <a:ext uri="{FF2B5EF4-FFF2-40B4-BE49-F238E27FC236}">
+                <a16:creationId xmlns:a16="http://schemas.microsoft.com/office/drawing/2014/main" id="{4194EEE0-B3FE-4BC0-90B4-AD8525BDF8D7}"/>
+              </a:ext>
+            </a:extLst>
+          </p:cNvPr>
+          <p:cNvPicPr>
+            <a:picLocks noChangeAspect="1"/>
+          </p:cNvPicPr>
+          <p:nvPr/>
+        </p:nvPicPr>
+        <p:blipFill rotWithShape="1">
+          <a:blip r:embed="rId12"/>
+          <a:srcRect r="91314" b="23450"/>
+          <a:stretch/>
+        </p:blipFill>
+        <p:spPr>
+          <a:xfrm>
+            <a:off x="5128450" y="1956786"/>
+            <a:ext cx="282123" cy="1516602"/>
+          </a:xfrm>
+          <a:prstGeom prst="rect">
+            <a:avLst/>
+          </a:prstGeom>
+        </p:spPr>
+      </p:pic>
+      <p:pic>
+        <p:nvPicPr>
+          <p:cNvPr id="32" name="Picture 31">
+            <a:extLst>
+              <a:ext uri="{FF2B5EF4-FFF2-40B4-BE49-F238E27FC236}">
+                <a16:creationId xmlns:a16="http://schemas.microsoft.com/office/drawing/2014/main" id="{54E1C166-D1AF-4999-9B84-7CF71B513761}"/>
+              </a:ext>
+            </a:extLst>
+          </p:cNvPr>
+          <p:cNvPicPr>
+            <a:picLocks noChangeAspect="1"/>
+          </p:cNvPicPr>
+          <p:nvPr/>
+        </p:nvPicPr>
+        <p:blipFill rotWithShape="1">
+          <a:blip r:embed="rId12"/>
+          <a:srcRect r="91314" b="23450"/>
+          <a:stretch/>
+        </p:blipFill>
+        <p:spPr>
+          <a:xfrm>
+            <a:off x="5128450" y="587940"/>
+            <a:ext cx="282123" cy="1516602"/>
+          </a:xfrm>
+          <a:prstGeom prst="rect">
+            <a:avLst/>
+          </a:prstGeom>
+        </p:spPr>
+      </p:pic>
+      <p:pic>
+        <p:nvPicPr>
+          <p:cNvPr id="33" name="Picture 32">
+            <a:extLst>
+              <a:ext uri="{FF2B5EF4-FFF2-40B4-BE49-F238E27FC236}">
+                <a16:creationId xmlns:a16="http://schemas.microsoft.com/office/drawing/2014/main" id="{D425D58B-BFFE-4FA1-AD89-386832746AEB}"/>
+              </a:ext>
+            </a:extLst>
+          </p:cNvPr>
+          <p:cNvPicPr>
+            <a:picLocks noChangeAspect="1"/>
+          </p:cNvPicPr>
+          <p:nvPr/>
+        </p:nvPicPr>
+        <p:blipFill rotWithShape="1">
+          <a:blip r:embed="rId12"/>
+          <a:srcRect r="91314" b="23450"/>
+          <a:stretch/>
+        </p:blipFill>
+        <p:spPr>
+          <a:xfrm>
+            <a:off x="9701966" y="1912398"/>
+            <a:ext cx="282123" cy="1516602"/>
+          </a:xfrm>
+          <a:prstGeom prst="rect">
+            <a:avLst/>
+          </a:prstGeom>
+        </p:spPr>
+      </p:pic>
+      <p:pic>
+        <p:nvPicPr>
+          <p:cNvPr id="34" name="Picture 33">
+            <a:extLst>
+              <a:ext uri="{FF2B5EF4-FFF2-40B4-BE49-F238E27FC236}">
+                <a16:creationId xmlns:a16="http://schemas.microsoft.com/office/drawing/2014/main" id="{73677F0A-8075-45D5-9F42-B282BC000E0E}"/>
+              </a:ext>
+            </a:extLst>
+          </p:cNvPr>
+          <p:cNvPicPr>
+            <a:picLocks noChangeAspect="1"/>
+          </p:cNvPicPr>
+          <p:nvPr/>
+        </p:nvPicPr>
+        <p:blipFill rotWithShape="1">
+          <a:blip r:embed="rId12"/>
+          <a:srcRect r="91314" b="23450"/>
+          <a:stretch/>
+        </p:blipFill>
+        <p:spPr>
+          <a:xfrm>
+            <a:off x="9701966" y="543552"/>
+            <a:ext cx="282123" cy="1516602"/>
+          </a:xfrm>
+          <a:prstGeom prst="rect">
+            <a:avLst/>
+          </a:prstGeom>
+        </p:spPr>
+      </p:pic>
+      <p:pic>
+        <p:nvPicPr>
+          <p:cNvPr id="8" name="Picture 7">
+            <a:extLst>
+              <a:ext uri="{FF2B5EF4-FFF2-40B4-BE49-F238E27FC236}">
+                <a16:creationId xmlns:a16="http://schemas.microsoft.com/office/drawing/2014/main" id="{F25823DF-546C-4C7C-B9F7-DF98BD7BB96A}"/>
+              </a:ext>
+            </a:extLst>
+          </p:cNvPr>
+          <p:cNvPicPr>
+            <a:picLocks noChangeAspect="1"/>
+          </p:cNvPicPr>
+          <p:nvPr/>
+        </p:nvPicPr>
+        <p:blipFill rotWithShape="1">
+          <a:blip r:embed="rId13"/>
+          <a:srcRect l="92909"/>
+          <a:stretch/>
+        </p:blipFill>
+        <p:spPr>
+          <a:xfrm>
+            <a:off x="3949414" y="538717"/>
+            <a:ext cx="256664" cy="1981200"/>
+          </a:xfrm>
+          <a:prstGeom prst="rect">
+            <a:avLst/>
+          </a:prstGeom>
+        </p:spPr>
+      </p:pic>
+      <p:pic>
+        <p:nvPicPr>
+          <p:cNvPr id="35" name="Picture 34">
+            <a:extLst>
+              <a:ext uri="{FF2B5EF4-FFF2-40B4-BE49-F238E27FC236}">
+                <a16:creationId xmlns:a16="http://schemas.microsoft.com/office/drawing/2014/main" id="{5E738438-33D0-45A5-AC0B-B53E42A2FCB8}"/>
+              </a:ext>
+            </a:extLst>
+          </p:cNvPr>
+          <p:cNvPicPr>
+            <a:picLocks noChangeAspect="1"/>
+          </p:cNvPicPr>
+          <p:nvPr/>
+        </p:nvPicPr>
+        <p:blipFill rotWithShape="1">
+          <a:blip r:embed="rId13"/>
+          <a:srcRect l="92909"/>
+          <a:stretch/>
+        </p:blipFill>
+        <p:spPr>
+          <a:xfrm>
+            <a:off x="8423535" y="538717"/>
+            <a:ext cx="256664" cy="1981200"/>
+          </a:xfrm>
+          <a:prstGeom prst="rect">
+            <a:avLst/>
+          </a:prstGeom>
+        </p:spPr>
+      </p:pic>
+      <p:pic>
+        <p:nvPicPr>
+          <p:cNvPr id="36" name="Picture 35">
+            <a:extLst>
+              <a:ext uri="{FF2B5EF4-FFF2-40B4-BE49-F238E27FC236}">
+                <a16:creationId xmlns:a16="http://schemas.microsoft.com/office/drawing/2014/main" id="{62712369-03B5-460B-8CB5-967CFACFE074}"/>
+              </a:ext>
+            </a:extLst>
+          </p:cNvPr>
+          <p:cNvPicPr>
+            <a:picLocks noChangeAspect="1"/>
+          </p:cNvPicPr>
+          <p:nvPr/>
+        </p:nvPicPr>
+        <p:blipFill rotWithShape="1">
+          <a:blip r:embed="rId13"/>
+          <a:srcRect l="92909"/>
+          <a:stretch/>
+        </p:blipFill>
+        <p:spPr>
+          <a:xfrm>
+            <a:off x="13015054" y="553745"/>
+            <a:ext cx="256664" cy="1981200"/>
+          </a:xfrm>
+          <a:prstGeom prst="rect">
+            <a:avLst/>
+          </a:prstGeom>
+        </p:spPr>
+      </p:pic>
+    </p:spTree>
+    <p:extLst>
+      <p:ext uri="{BB962C8B-B14F-4D97-AF65-F5344CB8AC3E}">
+        <p14:creationId xmlns:p14="http://schemas.microsoft.com/office/powerpoint/2010/main" val="1510605589"/>
+      </p:ext>
+    </p:extLst>
+  </p:cSld>
+  <p:clrMapOvr>
+    <a:masterClrMapping/>
+  </p:clrMapOvr>
+</p:sld>
+</file>
+
 <file path=ppt/slides/slide2.xml><?xml version="1.0" encoding="utf-8"?>
 <p:sld xmlns:a="http://schemas.openxmlformats.org/drawingml/2006/main" xmlns:r="http://schemas.openxmlformats.org/officeDocument/2006/relationships" xmlns:p="http://schemas.openxmlformats.org/presentationml/2006/main">
   <p:cSld>
@@ -5565,6 +6548,1048 @@
     <p:extLst>
       <p:ext uri="{BB962C8B-B14F-4D97-AF65-F5344CB8AC3E}">
         <p14:creationId xmlns:p14="http://schemas.microsoft.com/office/powerpoint/2010/main" val="624965845"/>
+      </p:ext>
+    </p:extLst>
+  </p:cSld>
+  <p:clrMapOvr>
+    <a:masterClrMapping/>
+  </p:clrMapOvr>
+</p:sld>
+</file>
+
+<file path=ppt/slides/slide7.xml><?xml version="1.0" encoding="utf-8"?>
+<p:sld xmlns:a="http://schemas.openxmlformats.org/drawingml/2006/main" xmlns:r="http://schemas.openxmlformats.org/officeDocument/2006/relationships" xmlns:p="http://schemas.openxmlformats.org/presentationml/2006/main">
+  <p:cSld>
+    <p:spTree>
+      <p:nvGrpSpPr>
+        <p:cNvPr id="1" name=""/>
+        <p:cNvGrpSpPr/>
+        <p:nvPr/>
+      </p:nvGrpSpPr>
+      <p:grpSpPr>
+        <a:xfrm>
+          <a:off x="0" y="0"/>
+          <a:ext cx="0" cy="0"/>
+          <a:chOff x="0" y="0"/>
+          <a:chExt cx="0" cy="0"/>
+        </a:xfrm>
+      </p:grpSpPr>
+      <p:pic>
+        <p:nvPicPr>
+          <p:cNvPr id="5" name="Picture 4">
+            <a:extLst>
+              <a:ext uri="{FF2B5EF4-FFF2-40B4-BE49-F238E27FC236}">
+                <a16:creationId xmlns:a16="http://schemas.microsoft.com/office/drawing/2014/main" id="{3AE4CF46-3DFA-4F13-99B2-CEC3382493E4}"/>
+              </a:ext>
+            </a:extLst>
+          </p:cNvPr>
+          <p:cNvPicPr>
+            <a:picLocks noChangeAspect="1"/>
+          </p:cNvPicPr>
+          <p:nvPr/>
+        </p:nvPicPr>
+        <p:blipFill rotWithShape="1">
+          <a:blip r:embed="rId2"/>
+          <a:srcRect l="68485" t="35437" r="19864" b="-1398"/>
+          <a:stretch/>
+        </p:blipFill>
+        <p:spPr>
+          <a:xfrm>
+            <a:off x="106532" y="790113"/>
+            <a:ext cx="443884" cy="1256560"/>
+          </a:xfrm>
+          <a:prstGeom prst="rect">
+            <a:avLst/>
+          </a:prstGeom>
+        </p:spPr>
+      </p:pic>
+      <p:pic>
+        <p:nvPicPr>
+          <p:cNvPr id="6" name="Picture 5">
+            <a:extLst>
+              <a:ext uri="{FF2B5EF4-FFF2-40B4-BE49-F238E27FC236}">
+                <a16:creationId xmlns:a16="http://schemas.microsoft.com/office/drawing/2014/main" id="{FD5469C1-8E0E-45F9-9B9B-352747BADC22}"/>
+              </a:ext>
+            </a:extLst>
+          </p:cNvPr>
+          <p:cNvPicPr>
+            <a:picLocks noChangeAspect="1"/>
+          </p:cNvPicPr>
+          <p:nvPr/>
+        </p:nvPicPr>
+        <p:blipFill rotWithShape="1">
+          <a:blip r:embed="rId3"/>
+          <a:srcRect t="76238"/>
+          <a:stretch/>
+        </p:blipFill>
+        <p:spPr>
+          <a:xfrm>
+            <a:off x="578301" y="3435705"/>
+            <a:ext cx="3810000" cy="452669"/>
+          </a:xfrm>
+          <a:prstGeom prst="rect">
+            <a:avLst/>
+          </a:prstGeom>
+        </p:spPr>
+      </p:pic>
+      <p:pic>
+        <p:nvPicPr>
+          <p:cNvPr id="9" name="Picture 8">
+            <a:extLst>
+              <a:ext uri="{FF2B5EF4-FFF2-40B4-BE49-F238E27FC236}">
+                <a16:creationId xmlns:a16="http://schemas.microsoft.com/office/drawing/2014/main" id="{BF6435F2-C277-4233-99FA-64204E3FFFC2}"/>
+              </a:ext>
+            </a:extLst>
+          </p:cNvPr>
+          <p:cNvPicPr>
+            <a:picLocks noChangeAspect="1"/>
+          </p:cNvPicPr>
+          <p:nvPr/>
+        </p:nvPicPr>
+        <p:blipFill rotWithShape="1">
+          <a:blip r:embed="rId2"/>
+          <a:srcRect l="68485" t="35437" r="19864" b="-1398"/>
+          <a:stretch/>
+        </p:blipFill>
+        <p:spPr>
+          <a:xfrm>
+            <a:off x="4542914" y="790113"/>
+            <a:ext cx="443884" cy="1256560"/>
+          </a:xfrm>
+          <a:prstGeom prst="rect">
+            <a:avLst/>
+          </a:prstGeom>
+        </p:spPr>
+      </p:pic>
+      <p:pic>
+        <p:nvPicPr>
+          <p:cNvPr id="11" name="Picture 10">
+            <a:extLst>
+              <a:ext uri="{FF2B5EF4-FFF2-40B4-BE49-F238E27FC236}">
+                <a16:creationId xmlns:a16="http://schemas.microsoft.com/office/drawing/2014/main" id="{524759C8-9C8A-4752-937A-2DBA0DBF1B71}"/>
+              </a:ext>
+            </a:extLst>
+          </p:cNvPr>
+          <p:cNvPicPr>
+            <a:picLocks noChangeAspect="1"/>
+          </p:cNvPicPr>
+          <p:nvPr/>
+        </p:nvPicPr>
+        <p:blipFill rotWithShape="1">
+          <a:blip r:embed="rId3"/>
+          <a:srcRect t="76238"/>
+          <a:stretch/>
+        </p:blipFill>
+        <p:spPr>
+          <a:xfrm>
+            <a:off x="5044414" y="3429000"/>
+            <a:ext cx="3810000" cy="452669"/>
+          </a:xfrm>
+          <a:prstGeom prst="rect">
+            <a:avLst/>
+          </a:prstGeom>
+        </p:spPr>
+      </p:pic>
+      <p:pic>
+        <p:nvPicPr>
+          <p:cNvPr id="13" name="Picture 12">
+            <a:extLst>
+              <a:ext uri="{FF2B5EF4-FFF2-40B4-BE49-F238E27FC236}">
+                <a16:creationId xmlns:a16="http://schemas.microsoft.com/office/drawing/2014/main" id="{4E43710F-D92F-4FD5-B4AB-8407541969D4}"/>
+              </a:ext>
+            </a:extLst>
+          </p:cNvPr>
+          <p:cNvPicPr>
+            <a:picLocks noChangeAspect="1"/>
+          </p:cNvPicPr>
+          <p:nvPr/>
+        </p:nvPicPr>
+        <p:blipFill rotWithShape="1">
+          <a:blip r:embed="rId4"/>
+          <a:srcRect l="69281" t="46680" r="19068" b="10310"/>
+          <a:stretch/>
+        </p:blipFill>
+        <p:spPr>
+          <a:xfrm>
+            <a:off x="9038069" y="1008726"/>
+            <a:ext cx="443884" cy="819334"/>
+          </a:xfrm>
+          <a:prstGeom prst="rect">
+            <a:avLst/>
+          </a:prstGeom>
+        </p:spPr>
+      </p:pic>
+      <p:pic>
+        <p:nvPicPr>
+          <p:cNvPr id="15" name="Picture 14">
+            <a:extLst>
+              <a:ext uri="{FF2B5EF4-FFF2-40B4-BE49-F238E27FC236}">
+                <a16:creationId xmlns:a16="http://schemas.microsoft.com/office/drawing/2014/main" id="{3AF15EA2-5805-4770-BC36-A14E47320190}"/>
+              </a:ext>
+            </a:extLst>
+          </p:cNvPr>
+          <p:cNvPicPr>
+            <a:picLocks noChangeAspect="1"/>
+          </p:cNvPicPr>
+          <p:nvPr/>
+        </p:nvPicPr>
+        <p:blipFill rotWithShape="1">
+          <a:blip r:embed="rId5"/>
+          <a:srcRect l="69015" t="33728" r="17670" b="4446"/>
+          <a:stretch/>
+        </p:blipFill>
+        <p:spPr>
+          <a:xfrm>
+            <a:off x="9038069" y="2194450"/>
+            <a:ext cx="443884" cy="1177770"/>
+          </a:xfrm>
+          <a:prstGeom prst="rect">
+            <a:avLst/>
+          </a:prstGeom>
+        </p:spPr>
+      </p:pic>
+      <p:pic>
+        <p:nvPicPr>
+          <p:cNvPr id="16" name="Picture 15">
+            <a:extLst>
+              <a:ext uri="{FF2B5EF4-FFF2-40B4-BE49-F238E27FC236}">
+                <a16:creationId xmlns:a16="http://schemas.microsoft.com/office/drawing/2014/main" id="{7DF361E2-AE37-4184-8F86-CF645E531ABF}"/>
+              </a:ext>
+            </a:extLst>
+          </p:cNvPr>
+          <p:cNvPicPr>
+            <a:picLocks noChangeAspect="1"/>
+          </p:cNvPicPr>
+          <p:nvPr/>
+        </p:nvPicPr>
+        <p:blipFill rotWithShape="1">
+          <a:blip r:embed="rId5"/>
+          <a:srcRect l="69015" t="33728" r="17670" b="33136"/>
+          <a:stretch/>
+        </p:blipFill>
+        <p:spPr>
+          <a:xfrm>
+            <a:off x="4542914" y="2467715"/>
+            <a:ext cx="443884" cy="631239"/>
+          </a:xfrm>
+          <a:prstGeom prst="rect">
+            <a:avLst/>
+          </a:prstGeom>
+        </p:spPr>
+      </p:pic>
+      <p:pic>
+        <p:nvPicPr>
+          <p:cNvPr id="17" name="Picture 16">
+            <a:extLst>
+              <a:ext uri="{FF2B5EF4-FFF2-40B4-BE49-F238E27FC236}">
+                <a16:creationId xmlns:a16="http://schemas.microsoft.com/office/drawing/2014/main" id="{C07F6909-406F-4DD9-9218-7C6271E539E6}"/>
+              </a:ext>
+            </a:extLst>
+          </p:cNvPr>
+          <p:cNvPicPr>
+            <a:picLocks noChangeAspect="1"/>
+          </p:cNvPicPr>
+          <p:nvPr/>
+        </p:nvPicPr>
+        <p:blipFill rotWithShape="1">
+          <a:blip r:embed="rId5"/>
+          <a:srcRect l="69015" t="33728" r="17670" b="19087"/>
+          <a:stretch/>
+        </p:blipFill>
+        <p:spPr>
+          <a:xfrm>
+            <a:off x="81989" y="2333902"/>
+            <a:ext cx="443884" cy="898864"/>
+          </a:xfrm>
+          <a:prstGeom prst="rect">
+            <a:avLst/>
+          </a:prstGeom>
+        </p:spPr>
+      </p:pic>
+      <p:pic>
+        <p:nvPicPr>
+          <p:cNvPr id="21" name="Picture 20">
+            <a:extLst>
+              <a:ext uri="{FF2B5EF4-FFF2-40B4-BE49-F238E27FC236}">
+                <a16:creationId xmlns:a16="http://schemas.microsoft.com/office/drawing/2014/main" id="{72518B04-969D-4DE3-8DAA-BC42E0A2890E}"/>
+              </a:ext>
+            </a:extLst>
+          </p:cNvPr>
+          <p:cNvPicPr>
+            <a:picLocks noChangeAspect="1"/>
+          </p:cNvPicPr>
+          <p:nvPr/>
+        </p:nvPicPr>
+        <p:blipFill rotWithShape="1">
+          <a:blip r:embed="rId3"/>
+          <a:srcRect t="76238"/>
+          <a:stretch/>
+        </p:blipFill>
+        <p:spPr>
+          <a:xfrm>
+            <a:off x="9524814" y="3435705"/>
+            <a:ext cx="3810000" cy="452669"/>
+          </a:xfrm>
+          <a:prstGeom prst="rect">
+            <a:avLst/>
+          </a:prstGeom>
+        </p:spPr>
+      </p:pic>
+      <p:pic>
+        <p:nvPicPr>
+          <p:cNvPr id="2" name="Picture 1">
+            <a:extLst>
+              <a:ext uri="{FF2B5EF4-FFF2-40B4-BE49-F238E27FC236}">
+                <a16:creationId xmlns:a16="http://schemas.microsoft.com/office/drawing/2014/main" id="{30D689F7-656A-407C-B55F-ED4E1ADD1EE4}"/>
+              </a:ext>
+            </a:extLst>
+          </p:cNvPr>
+          <p:cNvPicPr>
+            <a:picLocks noChangeAspect="1"/>
+          </p:cNvPicPr>
+          <p:nvPr/>
+        </p:nvPicPr>
+        <p:blipFill rotWithShape="1">
+          <a:blip r:embed="rId6"/>
+          <a:srcRect b="14869"/>
+          <a:stretch/>
+        </p:blipFill>
+        <p:spPr>
+          <a:xfrm>
+            <a:off x="602501" y="600353"/>
+            <a:ext cx="3619500" cy="1443360"/>
+          </a:xfrm>
+          <a:prstGeom prst="rect">
+            <a:avLst/>
+          </a:prstGeom>
+        </p:spPr>
+      </p:pic>
+      <p:pic>
+        <p:nvPicPr>
+          <p:cNvPr id="3" name="Picture 2">
+            <a:extLst>
+              <a:ext uri="{FF2B5EF4-FFF2-40B4-BE49-F238E27FC236}">
+                <a16:creationId xmlns:a16="http://schemas.microsoft.com/office/drawing/2014/main" id="{7A6B6DBA-1DBA-4D7E-AA77-F55379F561DD}"/>
+              </a:ext>
+            </a:extLst>
+          </p:cNvPr>
+          <p:cNvPicPr>
+            <a:picLocks noChangeAspect="1"/>
+          </p:cNvPicPr>
+          <p:nvPr/>
+        </p:nvPicPr>
+        <p:blipFill rotWithShape="1">
+          <a:blip r:embed="rId7"/>
+          <a:srcRect b="24795"/>
+          <a:stretch/>
+        </p:blipFill>
+        <p:spPr>
+          <a:xfrm>
+            <a:off x="602501" y="1983420"/>
+            <a:ext cx="3248025" cy="1489968"/>
+          </a:xfrm>
+          <a:prstGeom prst="rect">
+            <a:avLst/>
+          </a:prstGeom>
+        </p:spPr>
+      </p:pic>
+      <p:pic>
+        <p:nvPicPr>
+          <p:cNvPr id="10" name="Picture 9">
+            <a:extLst>
+              <a:ext uri="{FF2B5EF4-FFF2-40B4-BE49-F238E27FC236}">
+                <a16:creationId xmlns:a16="http://schemas.microsoft.com/office/drawing/2014/main" id="{1E8B80EB-9730-49F4-8C72-C6F79CC6EF07}"/>
+              </a:ext>
+            </a:extLst>
+          </p:cNvPr>
+          <p:cNvPicPr>
+            <a:picLocks noChangeAspect="1"/>
+          </p:cNvPicPr>
+          <p:nvPr/>
+        </p:nvPicPr>
+        <p:blipFill rotWithShape="1">
+          <a:blip r:embed="rId8"/>
+          <a:srcRect b="24795"/>
+          <a:stretch/>
+        </p:blipFill>
+        <p:spPr>
+          <a:xfrm>
+            <a:off x="5072429" y="553745"/>
+            <a:ext cx="3619500" cy="1489968"/>
+          </a:xfrm>
+          <a:prstGeom prst="rect">
+            <a:avLst/>
+          </a:prstGeom>
+        </p:spPr>
+      </p:pic>
+      <p:pic>
+        <p:nvPicPr>
+          <p:cNvPr id="19" name="Picture 18">
+            <a:extLst>
+              <a:ext uri="{FF2B5EF4-FFF2-40B4-BE49-F238E27FC236}">
+                <a16:creationId xmlns:a16="http://schemas.microsoft.com/office/drawing/2014/main" id="{734FAF7D-F0E5-40CB-BDD4-63FDD4F32B9F}"/>
+              </a:ext>
+            </a:extLst>
+          </p:cNvPr>
+          <p:cNvPicPr>
+            <a:picLocks noChangeAspect="1"/>
+          </p:cNvPicPr>
+          <p:nvPr/>
+        </p:nvPicPr>
+        <p:blipFill rotWithShape="1">
+          <a:blip r:embed="rId9"/>
+          <a:srcRect b="24795"/>
+          <a:stretch/>
+        </p:blipFill>
+        <p:spPr>
+          <a:xfrm>
+            <a:off x="5072429" y="1983420"/>
+            <a:ext cx="3248025" cy="1489968"/>
+          </a:xfrm>
+          <a:prstGeom prst="rect">
+            <a:avLst/>
+          </a:prstGeom>
+        </p:spPr>
+      </p:pic>
+      <p:pic>
+        <p:nvPicPr>
+          <p:cNvPr id="27" name="Picture 26">
+            <a:extLst>
+              <a:ext uri="{FF2B5EF4-FFF2-40B4-BE49-F238E27FC236}">
+                <a16:creationId xmlns:a16="http://schemas.microsoft.com/office/drawing/2014/main" id="{0256612F-4B90-4BAE-9D1E-CCDD156C22D7}"/>
+              </a:ext>
+            </a:extLst>
+          </p:cNvPr>
+          <p:cNvPicPr>
+            <a:picLocks noChangeAspect="1"/>
+          </p:cNvPicPr>
+          <p:nvPr/>
+        </p:nvPicPr>
+        <p:blipFill rotWithShape="1">
+          <a:blip r:embed="rId10"/>
+          <a:srcRect b="24036"/>
+          <a:stretch/>
+        </p:blipFill>
+        <p:spPr>
+          <a:xfrm>
+            <a:off x="9620064" y="538717"/>
+            <a:ext cx="3619500" cy="1504996"/>
+          </a:xfrm>
+          <a:prstGeom prst="rect">
+            <a:avLst/>
+          </a:prstGeom>
+        </p:spPr>
+      </p:pic>
+      <p:pic>
+        <p:nvPicPr>
+          <p:cNvPr id="28" name="Picture 27">
+            <a:extLst>
+              <a:ext uri="{FF2B5EF4-FFF2-40B4-BE49-F238E27FC236}">
+                <a16:creationId xmlns:a16="http://schemas.microsoft.com/office/drawing/2014/main" id="{D66E4971-DD6F-447D-913A-3639AA0215A6}"/>
+              </a:ext>
+            </a:extLst>
+          </p:cNvPr>
+          <p:cNvPicPr>
+            <a:picLocks noChangeAspect="1"/>
+          </p:cNvPicPr>
+          <p:nvPr/>
+        </p:nvPicPr>
+        <p:blipFill rotWithShape="1">
+          <a:blip r:embed="rId11"/>
+          <a:srcRect b="24039"/>
+          <a:stretch/>
+        </p:blipFill>
+        <p:spPr>
+          <a:xfrm>
+            <a:off x="9620064" y="1968438"/>
+            <a:ext cx="3248025" cy="1504950"/>
+          </a:xfrm>
+          <a:prstGeom prst="rect">
+            <a:avLst/>
+          </a:prstGeom>
+        </p:spPr>
+      </p:pic>
+      <p:sp>
+        <p:nvSpPr>
+          <p:cNvPr id="29" name="TextBox 28">
+            <a:extLst>
+              <a:ext uri="{FF2B5EF4-FFF2-40B4-BE49-F238E27FC236}">
+                <a16:creationId xmlns:a16="http://schemas.microsoft.com/office/drawing/2014/main" id="{BD2C6DC2-686C-4940-97BF-0887EF0EEA1E}"/>
+              </a:ext>
+            </a:extLst>
+          </p:cNvPr>
+          <p:cNvSpPr txBox="1"/>
+          <p:nvPr/>
+        </p:nvSpPr>
+        <p:spPr>
+          <a:xfrm>
+            <a:off x="2085990" y="3876223"/>
+            <a:ext cx="1085850" cy="338554"/>
+          </a:xfrm>
+          <a:prstGeom prst="rect">
+            <a:avLst/>
+          </a:prstGeom>
+          <a:noFill/>
+        </p:spPr>
+        <p:txBody>
+          <a:bodyPr wrap="square" rtlCol="0">
+            <a:spAutoFit/>
+          </a:bodyPr>
+          <a:lstStyle/>
+          <a:p>
+            <a:r>
+              <a:rPr lang="en-US" sz="1600" dirty="0">
+                <a:latin typeface="Times New Roman" panose="02020603050405020304" pitchFamily="18" charset="0"/>
+                <a:cs typeface="Times New Roman" panose="02020603050405020304" pitchFamily="18" charset="0"/>
+              </a:rPr>
+              <a:t>(a)</a:t>
+            </a:r>
+          </a:p>
+        </p:txBody>
+      </p:sp>
+      <p:sp>
+        <p:nvSpPr>
+          <p:cNvPr id="30" name="TextBox 29">
+            <a:extLst>
+              <a:ext uri="{FF2B5EF4-FFF2-40B4-BE49-F238E27FC236}">
+                <a16:creationId xmlns:a16="http://schemas.microsoft.com/office/drawing/2014/main" id="{04F0A6BA-F591-4822-BC5D-7CB2C1AEFD18}"/>
+              </a:ext>
+            </a:extLst>
+          </p:cNvPr>
+          <p:cNvSpPr txBox="1"/>
+          <p:nvPr/>
+        </p:nvSpPr>
+        <p:spPr>
+          <a:xfrm>
+            <a:off x="6551969" y="3876223"/>
+            <a:ext cx="1085850" cy="338554"/>
+          </a:xfrm>
+          <a:prstGeom prst="rect">
+            <a:avLst/>
+          </a:prstGeom>
+          <a:noFill/>
+        </p:spPr>
+        <p:txBody>
+          <a:bodyPr wrap="square" rtlCol="0">
+            <a:spAutoFit/>
+          </a:bodyPr>
+          <a:lstStyle/>
+          <a:p>
+            <a:r>
+              <a:rPr lang="en-US" sz="1600" dirty="0">
+                <a:latin typeface="Times New Roman" panose="02020603050405020304" pitchFamily="18" charset="0"/>
+                <a:cs typeface="Times New Roman" panose="02020603050405020304" pitchFamily="18" charset="0"/>
+              </a:rPr>
+              <a:t>(b)</a:t>
+            </a:r>
+          </a:p>
+        </p:txBody>
+      </p:sp>
+      <p:sp>
+        <p:nvSpPr>
+          <p:cNvPr id="31" name="TextBox 30">
+            <a:extLst>
+              <a:ext uri="{FF2B5EF4-FFF2-40B4-BE49-F238E27FC236}">
+                <a16:creationId xmlns:a16="http://schemas.microsoft.com/office/drawing/2014/main" id="{CB0DB553-8A88-48E7-A761-2A2E59EFE9F1}"/>
+              </a:ext>
+            </a:extLst>
+          </p:cNvPr>
+          <p:cNvSpPr txBox="1"/>
+          <p:nvPr/>
+        </p:nvSpPr>
+        <p:spPr>
+          <a:xfrm>
+            <a:off x="11017948" y="3876223"/>
+            <a:ext cx="1085850" cy="338554"/>
+          </a:xfrm>
+          <a:prstGeom prst="rect">
+            <a:avLst/>
+          </a:prstGeom>
+          <a:noFill/>
+        </p:spPr>
+        <p:txBody>
+          <a:bodyPr wrap="square" rtlCol="0">
+            <a:spAutoFit/>
+          </a:bodyPr>
+          <a:lstStyle/>
+          <a:p>
+            <a:r>
+              <a:rPr lang="en-US" sz="1600" dirty="0">
+                <a:latin typeface="Times New Roman" panose="02020603050405020304" pitchFamily="18" charset="0"/>
+                <a:cs typeface="Times New Roman" panose="02020603050405020304" pitchFamily="18" charset="0"/>
+              </a:rPr>
+              <a:t>(c)</a:t>
+            </a:r>
+          </a:p>
+        </p:txBody>
+      </p:sp>
+      <p:pic>
+        <p:nvPicPr>
+          <p:cNvPr id="4" name="Picture 3">
+            <a:extLst>
+              <a:ext uri="{FF2B5EF4-FFF2-40B4-BE49-F238E27FC236}">
+                <a16:creationId xmlns:a16="http://schemas.microsoft.com/office/drawing/2014/main" id="{3DE36A61-6984-4A25-8E34-0A8AE86F937F}"/>
+              </a:ext>
+            </a:extLst>
+          </p:cNvPr>
+          <p:cNvPicPr>
+            <a:picLocks noChangeAspect="1"/>
+          </p:cNvPicPr>
+          <p:nvPr/>
+        </p:nvPicPr>
+        <p:blipFill>
+          <a:blip r:embed="rId12"/>
+          <a:stretch>
+            <a:fillRect/>
+          </a:stretch>
+        </p:blipFill>
+        <p:spPr>
+          <a:xfrm>
+            <a:off x="2483301" y="4350059"/>
+            <a:ext cx="3248025" cy="1981200"/>
+          </a:xfrm>
+          <a:prstGeom prst="rect">
+            <a:avLst/>
+          </a:prstGeom>
+        </p:spPr>
+      </p:pic>
+    </p:spTree>
+    <p:extLst>
+      <p:ext uri="{BB962C8B-B14F-4D97-AF65-F5344CB8AC3E}">
+        <p14:creationId xmlns:p14="http://schemas.microsoft.com/office/powerpoint/2010/main" val="1429434880"/>
+      </p:ext>
+    </p:extLst>
+  </p:cSld>
+  <p:clrMapOvr>
+    <a:masterClrMapping/>
+  </p:clrMapOvr>
+</p:sld>
+</file>
+
+<file path=ppt/slides/slide8.xml><?xml version="1.0" encoding="utf-8"?>
+<p:sld xmlns:a="http://schemas.openxmlformats.org/drawingml/2006/main" xmlns:r="http://schemas.openxmlformats.org/officeDocument/2006/relationships" xmlns:p="http://schemas.openxmlformats.org/presentationml/2006/main">
+  <p:cSld>
+    <p:spTree>
+      <p:nvGrpSpPr>
+        <p:cNvPr id="1" name=""/>
+        <p:cNvGrpSpPr/>
+        <p:nvPr/>
+      </p:nvGrpSpPr>
+      <p:grpSpPr>
+        <a:xfrm>
+          <a:off x="0" y="0"/>
+          <a:ext cx="0" cy="0"/>
+          <a:chOff x="0" y="0"/>
+          <a:chExt cx="0" cy="0"/>
+        </a:xfrm>
+      </p:grpSpPr>
+      <p:pic>
+        <p:nvPicPr>
+          <p:cNvPr id="25" name="Picture 24">
+            <a:extLst>
+              <a:ext uri="{FF2B5EF4-FFF2-40B4-BE49-F238E27FC236}">
+                <a16:creationId xmlns:a16="http://schemas.microsoft.com/office/drawing/2014/main" id="{896DB66D-7D79-47A6-BAFE-0BECE303782F}"/>
+              </a:ext>
+            </a:extLst>
+          </p:cNvPr>
+          <p:cNvPicPr>
+            <a:picLocks noChangeAspect="1"/>
+          </p:cNvPicPr>
+          <p:nvPr/>
+        </p:nvPicPr>
+        <p:blipFill>
+          <a:blip r:embed="rId2"/>
+          <a:stretch>
+            <a:fillRect/>
+          </a:stretch>
+        </p:blipFill>
+        <p:spPr>
+          <a:xfrm>
+            <a:off x="3650501" y="527173"/>
+            <a:ext cx="3619500" cy="1981200"/>
+          </a:xfrm>
+          <a:prstGeom prst="rect">
+            <a:avLst/>
+          </a:prstGeom>
+        </p:spPr>
+      </p:pic>
+      <p:pic>
+        <p:nvPicPr>
+          <p:cNvPr id="26" name="Picture 25">
+            <a:extLst>
+              <a:ext uri="{FF2B5EF4-FFF2-40B4-BE49-F238E27FC236}">
+                <a16:creationId xmlns:a16="http://schemas.microsoft.com/office/drawing/2014/main" id="{6F243693-4C7E-470C-B09C-864ABD37613B}"/>
+              </a:ext>
+            </a:extLst>
+          </p:cNvPr>
+          <p:cNvPicPr>
+            <a:picLocks noChangeAspect="1"/>
+          </p:cNvPicPr>
+          <p:nvPr/>
+        </p:nvPicPr>
+        <p:blipFill rotWithShape="1">
+          <a:blip r:embed="rId3"/>
+          <a:srcRect b="24795"/>
+          <a:stretch/>
+        </p:blipFill>
+        <p:spPr>
+          <a:xfrm>
+            <a:off x="200391" y="3429000"/>
+            <a:ext cx="3248025" cy="1489968"/>
+          </a:xfrm>
+          <a:prstGeom prst="rect">
+            <a:avLst/>
+          </a:prstGeom>
+        </p:spPr>
+      </p:pic>
+      <p:pic>
+        <p:nvPicPr>
+          <p:cNvPr id="29" name="Picture 28">
+            <a:extLst>
+              <a:ext uri="{FF2B5EF4-FFF2-40B4-BE49-F238E27FC236}">
+                <a16:creationId xmlns:a16="http://schemas.microsoft.com/office/drawing/2014/main" id="{F7FA9AC7-B11F-41F9-B212-5C76EFFFA9E1}"/>
+              </a:ext>
+            </a:extLst>
+          </p:cNvPr>
+          <p:cNvPicPr>
+            <a:picLocks noChangeAspect="1"/>
+          </p:cNvPicPr>
+          <p:nvPr/>
+        </p:nvPicPr>
+        <p:blipFill>
+          <a:blip r:embed="rId4"/>
+          <a:stretch>
+            <a:fillRect/>
+          </a:stretch>
+        </p:blipFill>
+        <p:spPr>
+          <a:xfrm>
+            <a:off x="4400966" y="3565864"/>
+            <a:ext cx="3248025" cy="1981200"/>
+          </a:xfrm>
+          <a:prstGeom prst="rect">
+            <a:avLst/>
+          </a:prstGeom>
+        </p:spPr>
+      </p:pic>
+    </p:spTree>
+    <p:extLst>
+      <p:ext uri="{BB962C8B-B14F-4D97-AF65-F5344CB8AC3E}">
+        <p14:creationId xmlns:p14="http://schemas.microsoft.com/office/powerpoint/2010/main" val="2295748262"/>
+      </p:ext>
+    </p:extLst>
+  </p:cSld>
+  <p:clrMapOvr>
+    <a:masterClrMapping/>
+  </p:clrMapOvr>
+</p:sld>
+</file>
+
+<file path=ppt/slides/slide9.xml><?xml version="1.0" encoding="utf-8"?>
+<p:sld xmlns:a="http://schemas.openxmlformats.org/drawingml/2006/main" xmlns:r="http://schemas.openxmlformats.org/officeDocument/2006/relationships" xmlns:p="http://schemas.openxmlformats.org/presentationml/2006/main">
+  <p:cSld>
+    <p:spTree>
+      <p:nvGrpSpPr>
+        <p:cNvPr id="1" name=""/>
+        <p:cNvGrpSpPr/>
+        <p:nvPr/>
+      </p:nvGrpSpPr>
+      <p:grpSpPr>
+        <a:xfrm>
+          <a:off x="0" y="0"/>
+          <a:ext cx="0" cy="0"/>
+          <a:chOff x="0" y="0"/>
+          <a:chExt cx="0" cy="0"/>
+        </a:xfrm>
+      </p:grpSpPr>
+      <p:sp>
+        <p:nvSpPr>
+          <p:cNvPr id="14" name="Rectangle 13">
+            <a:extLst>
+              <a:ext uri="{FF2B5EF4-FFF2-40B4-BE49-F238E27FC236}">
+                <a16:creationId xmlns:a16="http://schemas.microsoft.com/office/drawing/2014/main" id="{0DDA1881-884D-43FF-B18E-517EEA7B90D7}"/>
+              </a:ext>
+            </a:extLst>
+          </p:cNvPr>
+          <p:cNvSpPr/>
+          <p:nvPr/>
+        </p:nvSpPr>
+        <p:spPr>
+          <a:xfrm>
+            <a:off x="895350" y="1028330"/>
+            <a:ext cx="5743575" cy="3624773"/>
+          </a:xfrm>
+          <a:prstGeom prst="rect">
+            <a:avLst/>
+          </a:prstGeom>
+          <a:solidFill>
+            <a:schemeClr val="bg1"/>
+          </a:solidFill>
+          <a:ln>
+            <a:noFill/>
+          </a:ln>
+        </p:spPr>
+        <p:style>
+          <a:lnRef idx="2">
+            <a:schemeClr val="accent1">
+              <a:shade val="50000"/>
+            </a:schemeClr>
+          </a:lnRef>
+          <a:fillRef idx="1">
+            <a:schemeClr val="accent1"/>
+          </a:fillRef>
+          <a:effectRef idx="0">
+            <a:schemeClr val="accent1"/>
+          </a:effectRef>
+          <a:fontRef idx="minor">
+            <a:schemeClr val="lt1"/>
+          </a:fontRef>
+        </p:style>
+        <p:txBody>
+          <a:bodyPr rtlCol="0" anchor="ctr"/>
+          <a:lstStyle/>
+          <a:p>
+            <a:pPr algn="ctr"/>
+            <a:endParaRPr lang="en-US"/>
+          </a:p>
+        </p:txBody>
+      </p:sp>
+      <p:pic>
+        <p:nvPicPr>
+          <p:cNvPr id="6" name="Picture 5">
+            <a:extLst>
+              <a:ext uri="{FF2B5EF4-FFF2-40B4-BE49-F238E27FC236}">
+                <a16:creationId xmlns:a16="http://schemas.microsoft.com/office/drawing/2014/main" id="{1BCEC054-6D42-4D2E-8B92-99DAD44D497B}"/>
+              </a:ext>
+            </a:extLst>
+          </p:cNvPr>
+          <p:cNvPicPr>
+            <a:picLocks noChangeAspect="1"/>
+          </p:cNvPicPr>
+          <p:nvPr/>
+        </p:nvPicPr>
+        <p:blipFill rotWithShape="1">
+          <a:blip r:embed="rId2"/>
+          <a:srcRect l="5999" r="4995" b="21434"/>
+          <a:stretch/>
+        </p:blipFill>
+        <p:spPr>
+          <a:xfrm>
+            <a:off x="1896492" y="1071239"/>
+            <a:ext cx="4238887" cy="1556551"/>
+          </a:xfrm>
+          <a:prstGeom prst="rect">
+            <a:avLst/>
+          </a:prstGeom>
+        </p:spPr>
+      </p:pic>
+      <p:pic>
+        <p:nvPicPr>
+          <p:cNvPr id="8" name="Picture 7">
+            <a:extLst>
+              <a:ext uri="{FF2B5EF4-FFF2-40B4-BE49-F238E27FC236}">
+                <a16:creationId xmlns:a16="http://schemas.microsoft.com/office/drawing/2014/main" id="{A6C2D7B3-3EA1-44FE-9B03-D7F4A1084B35}"/>
+              </a:ext>
+            </a:extLst>
+          </p:cNvPr>
+          <p:cNvPicPr>
+            <a:picLocks noChangeAspect="1"/>
+          </p:cNvPicPr>
+          <p:nvPr/>
+        </p:nvPicPr>
+        <p:blipFill rotWithShape="1">
+          <a:blip r:embed="rId3"/>
+          <a:srcRect l="5313" b="10829"/>
+          <a:stretch/>
+        </p:blipFill>
+        <p:spPr>
+          <a:xfrm>
+            <a:off x="1879337" y="2627790"/>
+            <a:ext cx="4238887" cy="1766657"/>
+          </a:xfrm>
+          <a:prstGeom prst="rect">
+            <a:avLst/>
+          </a:prstGeom>
+        </p:spPr>
+      </p:pic>
+      <p:pic>
+        <p:nvPicPr>
+          <p:cNvPr id="9" name="Picture 8">
+            <a:extLst>
+              <a:ext uri="{FF2B5EF4-FFF2-40B4-BE49-F238E27FC236}">
+                <a16:creationId xmlns:a16="http://schemas.microsoft.com/office/drawing/2014/main" id="{AEC82F7B-8A7D-4789-BA19-D2E4472461B5}"/>
+              </a:ext>
+            </a:extLst>
+          </p:cNvPr>
+          <p:cNvPicPr>
+            <a:picLocks noChangeAspect="1"/>
+          </p:cNvPicPr>
+          <p:nvPr/>
+        </p:nvPicPr>
+        <p:blipFill rotWithShape="1">
+          <a:blip r:embed="rId4"/>
+          <a:srcRect l="68485" t="35437" r="19864" b="-1398"/>
+          <a:stretch/>
+        </p:blipFill>
+        <p:spPr>
+          <a:xfrm>
+            <a:off x="1056443" y="1323883"/>
+            <a:ext cx="443884" cy="1256560"/>
+          </a:xfrm>
+          <a:prstGeom prst="rect">
+            <a:avLst/>
+          </a:prstGeom>
+        </p:spPr>
+      </p:pic>
+      <p:pic>
+        <p:nvPicPr>
+          <p:cNvPr id="10" name="Picture 9">
+            <a:extLst>
+              <a:ext uri="{FF2B5EF4-FFF2-40B4-BE49-F238E27FC236}">
+                <a16:creationId xmlns:a16="http://schemas.microsoft.com/office/drawing/2014/main" id="{8DB669FF-4C2C-4A51-A2A9-804DC2BACC21}"/>
+              </a:ext>
+            </a:extLst>
+          </p:cNvPr>
+          <p:cNvPicPr>
+            <a:picLocks noChangeAspect="1"/>
+          </p:cNvPicPr>
+          <p:nvPr/>
+        </p:nvPicPr>
+        <p:blipFill rotWithShape="1">
+          <a:blip r:embed="rId5"/>
+          <a:srcRect l="69015" t="33728" r="17670" b="4446"/>
+          <a:stretch/>
+        </p:blipFill>
+        <p:spPr>
+          <a:xfrm>
+            <a:off x="1039289" y="2744866"/>
+            <a:ext cx="443884" cy="1177770"/>
+          </a:xfrm>
+          <a:prstGeom prst="rect">
+            <a:avLst/>
+          </a:prstGeom>
+        </p:spPr>
+      </p:pic>
+      <p:pic>
+        <p:nvPicPr>
+          <p:cNvPr id="7" name="Picture 6">
+            <a:extLst>
+              <a:ext uri="{FF2B5EF4-FFF2-40B4-BE49-F238E27FC236}">
+                <a16:creationId xmlns:a16="http://schemas.microsoft.com/office/drawing/2014/main" id="{B7386255-1331-494C-B604-CD2FCAB3FDF0}"/>
+              </a:ext>
+            </a:extLst>
+          </p:cNvPr>
+          <p:cNvPicPr>
+            <a:picLocks noChangeAspect="1"/>
+          </p:cNvPicPr>
+          <p:nvPr/>
+        </p:nvPicPr>
+        <p:blipFill rotWithShape="1">
+          <a:blip r:embed="rId6"/>
+          <a:srcRect r="91314" b="23450"/>
+          <a:stretch/>
+        </p:blipFill>
+        <p:spPr>
+          <a:xfrm>
+            <a:off x="1738275" y="1111188"/>
+            <a:ext cx="282123" cy="1516602"/>
+          </a:xfrm>
+          <a:prstGeom prst="rect">
+            <a:avLst/>
+          </a:prstGeom>
+        </p:spPr>
+      </p:pic>
+      <p:pic>
+        <p:nvPicPr>
+          <p:cNvPr id="11" name="Picture 10">
+            <a:extLst>
+              <a:ext uri="{FF2B5EF4-FFF2-40B4-BE49-F238E27FC236}">
+                <a16:creationId xmlns:a16="http://schemas.microsoft.com/office/drawing/2014/main" id="{472607E4-8933-4B1C-A32C-BA7BC4B75EF4}"/>
+              </a:ext>
+            </a:extLst>
+          </p:cNvPr>
+          <p:cNvPicPr>
+            <a:picLocks noChangeAspect="1"/>
+          </p:cNvPicPr>
+          <p:nvPr/>
+        </p:nvPicPr>
+        <p:blipFill rotWithShape="1">
+          <a:blip r:embed="rId6"/>
+          <a:srcRect r="91314" b="23450"/>
+          <a:stretch/>
+        </p:blipFill>
+        <p:spPr>
+          <a:xfrm>
+            <a:off x="1738274" y="2670699"/>
+            <a:ext cx="282123" cy="1516602"/>
+          </a:xfrm>
+          <a:prstGeom prst="rect">
+            <a:avLst/>
+          </a:prstGeom>
+        </p:spPr>
+      </p:pic>
+      <p:pic>
+        <p:nvPicPr>
+          <p:cNvPr id="12" name="Picture 11">
+            <a:extLst>
+              <a:ext uri="{FF2B5EF4-FFF2-40B4-BE49-F238E27FC236}">
+                <a16:creationId xmlns:a16="http://schemas.microsoft.com/office/drawing/2014/main" id="{F71293CB-F3CA-4C36-90B3-6B6B7052E565}"/>
+              </a:ext>
+            </a:extLst>
+          </p:cNvPr>
+          <p:cNvPicPr>
+            <a:picLocks noChangeAspect="1"/>
+          </p:cNvPicPr>
+          <p:nvPr/>
+        </p:nvPicPr>
+        <p:blipFill rotWithShape="1">
+          <a:blip r:embed="rId7"/>
+          <a:srcRect l="92909"/>
+          <a:stretch/>
+        </p:blipFill>
+        <p:spPr>
+          <a:xfrm>
+            <a:off x="6096000" y="1111188"/>
+            <a:ext cx="256664" cy="1981200"/>
+          </a:xfrm>
+          <a:prstGeom prst="rect">
+            <a:avLst/>
+          </a:prstGeom>
+        </p:spPr>
+      </p:pic>
+      <p:pic>
+        <p:nvPicPr>
+          <p:cNvPr id="13" name="Picture 12">
+            <a:extLst>
+              <a:ext uri="{FF2B5EF4-FFF2-40B4-BE49-F238E27FC236}">
+                <a16:creationId xmlns:a16="http://schemas.microsoft.com/office/drawing/2014/main" id="{CFD0368E-23EF-4C2D-9B7A-3DE47C013433}"/>
+              </a:ext>
+            </a:extLst>
+          </p:cNvPr>
+          <p:cNvPicPr>
+            <a:picLocks noChangeAspect="1"/>
+          </p:cNvPicPr>
+          <p:nvPr/>
+        </p:nvPicPr>
+        <p:blipFill rotWithShape="1">
+          <a:blip r:embed="rId6"/>
+          <a:srcRect t="86945"/>
+          <a:stretch/>
+        </p:blipFill>
+        <p:spPr>
+          <a:xfrm>
+            <a:off x="2220671" y="4394447"/>
+            <a:ext cx="3248025" cy="258656"/>
+          </a:xfrm>
+          <a:prstGeom prst="rect">
+            <a:avLst/>
+          </a:prstGeom>
+        </p:spPr>
+      </p:pic>
+    </p:spTree>
+    <p:extLst>
+      <p:ext uri="{BB962C8B-B14F-4D97-AF65-F5344CB8AC3E}">
+        <p14:creationId xmlns:p14="http://schemas.microsoft.com/office/powerpoint/2010/main" val="2236962013"/>
       </p:ext>
     </p:extLst>
   </p:cSld>

</xml_diff>